<commit_message>
Updates all slides except diffusion model
</commit_message>
<xml_diff>
--- a/Slides/03 - Convoluational Neural Nets.pptx
+++ b/Slides/03 - Convoluational Neural Nets.pptx
@@ -239,7 +239,7 @@
           <a:p>
             <a:fld id="{8CD26A2A-0A96-0647-84E5-C82F2EFD9474}" type="datetimeFigureOut">
               <a:rPr lang="en-US" smtClean="0"/>
-              <a:t>7/31/2023</a:t>
+              <a:t>7/17/2024</a:t>
             </a:fld>
             <a:endParaRPr lang="en-US" dirty="0"/>
           </a:p>
@@ -416,7 +416,7 @@
           <a:p>
             <a:fld id="{A2B40C3B-E28A-4854-8EDA-E7F8F6F6FFEF}" type="datetimeFigureOut">
               <a:rPr lang="zh-CN" altLang="en-US" smtClean="0"/>
-              <a:t>2023/7/31</a:t>
+              <a:t>2024/7/17</a:t>
             </a:fld>
             <a:endParaRPr lang="zh-CN" altLang="en-US"/>
           </a:p>
@@ -13700,7 +13700,7 @@
           <a:p>
             <a:fld id="{09E5C060-5D66-4E28-B08A-91AD88D733E3}" type="datetime1">
               <a:rPr lang="en-US" smtClean="0"/>
-              <a:t>7/31/2023</a:t>
+              <a:t>7/17/2024</a:t>
             </a:fld>
             <a:endParaRPr lang="en-US"/>
           </a:p>
@@ -23159,477 +23159,107 @@
           </a:p>
         </p:txBody>
       </p:sp>
-      <mc:AlternateContent xmlns:mc="http://schemas.openxmlformats.org/markup-compatibility/2006" xmlns:a14="http://schemas.microsoft.com/office/drawing/2010/main">
-        <mc:Choice Requires="a14">
-          <p:sp>
-            <p:nvSpPr>
-              <p:cNvPr id="5" name="Content Placeholder 4"/>
-              <p:cNvSpPr>
-                <a:spLocks noGrp="1"/>
-              </p:cNvSpPr>
-              <p:nvPr>
-                <p:ph idx="1"/>
-              </p:nvPr>
-            </p:nvSpPr>
-            <p:spPr>
-              <a:xfrm>
-                <a:off x="838200" y="1786809"/>
-                <a:ext cx="6054376" cy="4390154"/>
-              </a:xfrm>
-            </p:spPr>
-            <p:txBody>
-              <a:bodyPr>
-                <a:normAutofit/>
-              </a:bodyPr>
-              <a:lstStyle/>
-              <a:p>
-                <a:pPr>
-                  <a:lnSpc>
-                    <a:spcPct val="100000"/>
-                  </a:lnSpc>
-                </a:pPr>
-                <a:r>
-                  <a:rPr lang="en-US" sz="1800" b="1" dirty="0"/>
-                  <a:t>Kernel Size </a:t>
-                </a:r>
-                <a:r>
-                  <a:rPr lang="en-US" sz="1800" dirty="0"/>
-                  <a:t>– The dimensions of the Kernel</a:t>
-                </a:r>
-              </a:p>
-              <a:p>
-                <a:pPr>
-                  <a:lnSpc>
-                    <a:spcPct val="100000"/>
-                  </a:lnSpc>
-                </a:pPr>
-                <a:r>
-                  <a:rPr lang="en-US" sz="1800" b="1" dirty="0"/>
-                  <a:t>Stride</a:t>
-                </a:r>
-                <a:r>
-                  <a:rPr lang="en-US" sz="1800" dirty="0"/>
-                  <a:t> – Length of step when sliding the window</a:t>
-                </a:r>
-              </a:p>
-              <a:p>
-                <a:pPr>
-                  <a:lnSpc>
-                    <a:spcPct val="100000"/>
-                  </a:lnSpc>
-                </a:pPr>
-                <a:r>
-                  <a:rPr lang="en-US" sz="1800" b="1" dirty="0"/>
-                  <a:t>Zero Padding </a:t>
-                </a:r>
-                <a:r>
-                  <a:rPr lang="en-US" sz="1800" dirty="0"/>
-                  <a:t>– Number of zeros added around boundary</a:t>
-                </a:r>
-              </a:p>
-              <a:p>
-                <a:pPr>
-                  <a:lnSpc>
-                    <a:spcPct val="100000"/>
-                  </a:lnSpc>
-                </a:pPr>
-                <a:endParaRPr lang="en-US" sz="1800" dirty="0"/>
-              </a:p>
-              <a:p>
-                <a:pPr>
-                  <a:lnSpc>
-                    <a:spcPct val="100000"/>
-                  </a:lnSpc>
-                </a:pPr>
-                <a:r>
-                  <a:rPr lang="en-US" sz="1800" dirty="0"/>
-                  <a:t>If we don’t flip </a:t>
-                </a:r>
-                <a14:m>
-                  <m:oMath xmlns:m="http://schemas.openxmlformats.org/officeDocument/2006/math">
-                    <m:r>
-                      <a:rPr lang="en-US" sz="1800" i="1">
-                        <a:latin typeface="Cambria Math" panose="02040503050406030204" pitchFamily="18" charset="0"/>
-                      </a:rPr>
-                      <m:t>𝐾</m:t>
-                    </m:r>
-                  </m:oMath>
-                </a14:m>
-                <a:r>
-                  <a:rPr lang="en-US" sz="1800" dirty="0"/>
-                  <a:t>, this is often referred to as cross-correlation. Flipping not essential for learning applications</a:t>
-                </a:r>
-              </a:p>
-              <a:p>
-                <a:pPr>
-                  <a:lnSpc>
-                    <a:spcPct val="100000"/>
-                  </a:lnSpc>
-                </a:pPr>
-                <a:endParaRPr lang="en-US" sz="1800" dirty="0"/>
-              </a:p>
-              <a:p>
-                <a:pPr>
-                  <a:lnSpc>
-                    <a:spcPct val="100000"/>
-                  </a:lnSpc>
-                </a:pPr>
-                <a:r>
-                  <a:rPr lang="en-US" sz="1800" dirty="0"/>
-                  <a:t>For multi-channel </a:t>
-                </a:r>
-                <a14:m>
-                  <m:oMath xmlns:m="http://schemas.openxmlformats.org/officeDocument/2006/math">
-                    <m:r>
-                      <a:rPr lang="en-US" sz="1800" i="1">
-                        <a:latin typeface="Cambria Math" panose="02040503050406030204" pitchFamily="18" charset="0"/>
-                      </a:rPr>
-                      <m:t>𝑥</m:t>
-                    </m:r>
-                  </m:oMath>
-                </a14:m>
-                <a:r>
-                  <a:rPr lang="en-US" sz="1800" dirty="0"/>
-                  <a:t>, we use a multi-channel kernel:</a:t>
-                </a:r>
-              </a:p>
-              <a:p>
-                <a:pPr marL="0" indent="0">
-                  <a:lnSpc>
-                    <a:spcPct val="100000"/>
-                  </a:lnSpc>
-                  <a:buNone/>
-                </a:pPr>
-                <a14:m>
-                  <m:oMathPara xmlns:m="http://schemas.openxmlformats.org/officeDocument/2006/math">
-                    <m:oMathParaPr>
-                      <m:jc m:val="centerGroup"/>
-                    </m:oMathParaPr>
-                    <m:oMath xmlns:m="http://schemas.openxmlformats.org/officeDocument/2006/math">
-                      <m:r>
-                        <a:rPr lang="en-US" sz="1800" i="1">
-                          <a:latin typeface="Cambria Math" panose="02040503050406030204" pitchFamily="18" charset="0"/>
-                        </a:rPr>
-                        <m:t>𝐹</m:t>
-                      </m:r>
-                      <m:d>
-                        <m:dPr>
-                          <m:ctrlPr>
-                            <a:rPr lang="en-US" sz="1800" i="1">
-                              <a:latin typeface="Cambria Math" panose="02040503050406030204" pitchFamily="18" charset="0"/>
-                            </a:rPr>
-                          </m:ctrlPr>
-                        </m:dPr>
-                        <m:e>
-                          <m:r>
-                            <a:rPr lang="en-US" sz="1800" i="1">
-                              <a:latin typeface="Cambria Math" panose="02040503050406030204" pitchFamily="18" charset="0"/>
-                            </a:rPr>
-                            <m:t>𝑖</m:t>
-                          </m:r>
-                          <m:r>
-                            <a:rPr lang="en-US" sz="1800" i="1">
-                              <a:latin typeface="Cambria Math" panose="02040503050406030204" pitchFamily="18" charset="0"/>
-                            </a:rPr>
-                            <m:t>,</m:t>
-                          </m:r>
-                          <m:r>
-                            <a:rPr lang="en-US" sz="1800" i="1">
-                              <a:latin typeface="Cambria Math" panose="02040503050406030204" pitchFamily="18" charset="0"/>
-                            </a:rPr>
-                            <m:t>𝑗</m:t>
-                          </m:r>
-                        </m:e>
-                      </m:d>
-                      <m:r>
-                        <a:rPr lang="en-US" sz="1800" i="1">
-                          <a:latin typeface="Cambria Math" panose="02040503050406030204" pitchFamily="18" charset="0"/>
-                        </a:rPr>
-                        <m:t>=</m:t>
-                      </m:r>
-                      <m:d>
-                        <m:dPr>
-                          <m:begChr m:val="["/>
-                          <m:endChr m:val="]"/>
-                          <m:ctrlPr>
-                            <a:rPr lang="en-US" sz="1800" i="1">
-                              <a:latin typeface="Cambria Math" panose="02040503050406030204" pitchFamily="18" charset="0"/>
-                            </a:rPr>
-                          </m:ctrlPr>
-                        </m:dPr>
-                        <m:e>
-                          <m:r>
-                            <a:rPr lang="en-US" sz="1800" i="1">
-                              <a:latin typeface="Cambria Math" panose="02040503050406030204" pitchFamily="18" charset="0"/>
-                            </a:rPr>
-                            <m:t>𝑋</m:t>
-                          </m:r>
-                          <m:r>
-                            <a:rPr lang="en-US" sz="1800" i="1">
-                              <a:latin typeface="Cambria Math" panose="02040503050406030204" pitchFamily="18" charset="0"/>
-                            </a:rPr>
-                            <m:t>∗</m:t>
-                          </m:r>
-                          <m:r>
-                            <a:rPr lang="en-US" sz="1800" i="1">
-                              <a:latin typeface="Cambria Math" panose="02040503050406030204" pitchFamily="18" charset="0"/>
-                            </a:rPr>
-                            <m:t>𝐾</m:t>
-                          </m:r>
-                        </m:e>
-                      </m:d>
-                      <m:d>
-                        <m:dPr>
-                          <m:ctrlPr>
-                            <a:rPr lang="en-US" sz="1800" i="1">
-                              <a:latin typeface="Cambria Math" panose="02040503050406030204" pitchFamily="18" charset="0"/>
-                            </a:rPr>
-                          </m:ctrlPr>
-                        </m:dPr>
-                        <m:e>
-                          <m:r>
-                            <a:rPr lang="en-US" sz="1800" i="1">
-                              <a:latin typeface="Cambria Math" panose="02040503050406030204" pitchFamily="18" charset="0"/>
-                            </a:rPr>
-                            <m:t>𝑖</m:t>
-                          </m:r>
-                          <m:r>
-                            <a:rPr lang="en-US" sz="1800" i="1">
-                              <a:latin typeface="Cambria Math" panose="02040503050406030204" pitchFamily="18" charset="0"/>
-                            </a:rPr>
-                            <m:t>,</m:t>
-                          </m:r>
-                          <m:r>
-                            <a:rPr lang="en-US" sz="1800" i="1">
-                              <a:latin typeface="Cambria Math" panose="02040503050406030204" pitchFamily="18" charset="0"/>
-                            </a:rPr>
-                            <m:t>𝑗</m:t>
-                          </m:r>
-                        </m:e>
-                      </m:d>
-                      <m:r>
-                        <a:rPr lang="en-US" sz="1800" i="1">
-                          <a:latin typeface="Cambria Math" panose="02040503050406030204" pitchFamily="18" charset="0"/>
-                        </a:rPr>
-                        <m:t>=</m:t>
-                      </m:r>
-                      <m:nary>
-                        <m:naryPr>
-                          <m:chr m:val="∑"/>
-                          <m:supHide m:val="on"/>
-                          <m:ctrlPr>
-                            <a:rPr lang="en-US" sz="1800" i="1">
-                              <a:latin typeface="Cambria Math" panose="02040503050406030204" pitchFamily="18" charset="0"/>
-                            </a:rPr>
-                          </m:ctrlPr>
-                        </m:naryPr>
-                        <m:sub>
-                          <m:r>
-                            <a:rPr lang="en-US" sz="1800" i="1">
-                              <a:latin typeface="Cambria Math" panose="02040503050406030204" pitchFamily="18" charset="0"/>
-                            </a:rPr>
-                            <m:t>𝑝</m:t>
-                          </m:r>
-                          <m:r>
-                            <a:rPr lang="en-US" sz="1800" i="1">
-                              <a:latin typeface="Cambria Math" panose="02040503050406030204" pitchFamily="18" charset="0"/>
-                            </a:rPr>
-                            <m:t>,</m:t>
-                          </m:r>
-                          <m:r>
-                            <a:rPr lang="en-US" sz="1800" i="1">
-                              <a:latin typeface="Cambria Math" panose="02040503050406030204" pitchFamily="18" charset="0"/>
-                            </a:rPr>
-                            <m:t>𝑞</m:t>
-                          </m:r>
-                          <m:r>
-                            <a:rPr lang="en-US" sz="1800" i="1">
-                              <a:latin typeface="Cambria Math" panose="02040503050406030204" pitchFamily="18" charset="0"/>
-                            </a:rPr>
-                            <m:t>,</m:t>
-                          </m:r>
-                          <m:r>
-                            <a:rPr lang="en-US" sz="1800" i="1">
-                              <a:latin typeface="Cambria Math" panose="02040503050406030204" pitchFamily="18" charset="0"/>
-                            </a:rPr>
-                            <m:t>𝑐</m:t>
-                          </m:r>
-                        </m:sub>
-                        <m:sup/>
-                        <m:e>
-                          <m:r>
-                            <a:rPr lang="en-US" sz="1800" i="1">
-                              <a:latin typeface="Cambria Math" panose="02040503050406030204" pitchFamily="18" charset="0"/>
-                            </a:rPr>
-                            <m:t>𝑋</m:t>
-                          </m:r>
-                          <m:d>
-                            <m:dPr>
-                              <m:ctrlPr>
-                                <a:rPr lang="en-US" sz="1800" i="1">
-                                  <a:latin typeface="Cambria Math" panose="02040503050406030204" pitchFamily="18" charset="0"/>
-                                </a:rPr>
-                              </m:ctrlPr>
-                            </m:dPr>
-                            <m:e>
-                              <m:r>
-                                <a:rPr lang="en-US" sz="1800" i="1">
-                                  <a:latin typeface="Cambria Math" panose="02040503050406030204" pitchFamily="18" charset="0"/>
-                                </a:rPr>
-                                <m:t>𝑝</m:t>
-                              </m:r>
-                              <m:r>
-                                <a:rPr lang="en-US" sz="1800" i="1">
-                                  <a:latin typeface="Cambria Math" panose="02040503050406030204" pitchFamily="18" charset="0"/>
-                                </a:rPr>
-                                <m:t>,</m:t>
-                              </m:r>
-                              <m:r>
-                                <a:rPr lang="en-US" sz="1800" i="1">
-                                  <a:latin typeface="Cambria Math" panose="02040503050406030204" pitchFamily="18" charset="0"/>
-                                </a:rPr>
-                                <m:t>𝑞</m:t>
-                              </m:r>
-                              <m:r>
-                                <a:rPr lang="en-US" sz="1800" i="1">
-                                  <a:latin typeface="Cambria Math" panose="02040503050406030204" pitchFamily="18" charset="0"/>
-                                </a:rPr>
-                                <m:t>,</m:t>
-                              </m:r>
-                              <m:r>
-                                <a:rPr lang="en-US" sz="1800" i="1">
-                                  <a:latin typeface="Cambria Math" panose="02040503050406030204" pitchFamily="18" charset="0"/>
-                                </a:rPr>
-                                <m:t>𝑐</m:t>
-                              </m:r>
-                            </m:e>
-                          </m:d>
-                          <m:r>
-                            <a:rPr lang="en-US" sz="1800" i="1">
-                              <a:latin typeface="Cambria Math" panose="02040503050406030204" pitchFamily="18" charset="0"/>
-                            </a:rPr>
-                            <m:t>⋅</m:t>
-                          </m:r>
-                          <m:r>
-                            <a:rPr lang="en-US" sz="1800" i="1">
-                              <a:latin typeface="Cambria Math" panose="02040503050406030204" pitchFamily="18" charset="0"/>
-                            </a:rPr>
-                            <m:t>𝐾</m:t>
-                          </m:r>
-                          <m:r>
-                            <a:rPr lang="en-US" sz="1800" i="1">
-                              <a:latin typeface="Cambria Math" panose="02040503050406030204" pitchFamily="18" charset="0"/>
-                            </a:rPr>
-                            <m:t>(</m:t>
-                          </m:r>
-                          <m:r>
-                            <a:rPr lang="en-US" sz="1800" i="1">
-                              <a:latin typeface="Cambria Math" panose="02040503050406030204" pitchFamily="18" charset="0"/>
-                            </a:rPr>
-                            <m:t>𝑖</m:t>
-                          </m:r>
-                          <m:r>
-                            <a:rPr lang="en-US" sz="1800" i="1">
-                              <a:latin typeface="Cambria Math" panose="02040503050406030204" pitchFamily="18" charset="0"/>
-                            </a:rPr>
-                            <m:t>−</m:t>
-                          </m:r>
-                          <m:r>
-                            <a:rPr lang="en-US" sz="1800" i="1">
-                              <a:latin typeface="Cambria Math" panose="02040503050406030204" pitchFamily="18" charset="0"/>
-                            </a:rPr>
-                            <m:t>𝑝</m:t>
-                          </m:r>
-                          <m:r>
-                            <a:rPr lang="en-US" sz="1800" i="1">
-                              <a:latin typeface="Cambria Math" panose="02040503050406030204" pitchFamily="18" charset="0"/>
-                            </a:rPr>
-                            <m:t>,</m:t>
-                          </m:r>
-                          <m:r>
-                            <a:rPr lang="en-US" sz="1800" i="1">
-                              <a:latin typeface="Cambria Math" panose="02040503050406030204" pitchFamily="18" charset="0"/>
-                            </a:rPr>
-                            <m:t>𝑗</m:t>
-                          </m:r>
-                          <m:r>
-                            <a:rPr lang="en-US" sz="1800" i="1">
-                              <a:latin typeface="Cambria Math" panose="02040503050406030204" pitchFamily="18" charset="0"/>
-                            </a:rPr>
-                            <m:t>−</m:t>
-                          </m:r>
-                          <m:r>
-                            <a:rPr lang="en-US" sz="1800" i="1">
-                              <a:latin typeface="Cambria Math" panose="02040503050406030204" pitchFamily="18" charset="0"/>
-                            </a:rPr>
-                            <m:t>𝑞</m:t>
-                          </m:r>
-                          <m:r>
-                            <a:rPr lang="en-US" sz="1800" i="1">
-                              <a:latin typeface="Cambria Math" panose="02040503050406030204" pitchFamily="18" charset="0"/>
-                            </a:rPr>
-                            <m:t>,</m:t>
-                          </m:r>
-                          <m:r>
-                            <a:rPr lang="en-US" sz="1800" i="1">
-                              <a:latin typeface="Cambria Math" panose="02040503050406030204" pitchFamily="18" charset="0"/>
-                            </a:rPr>
-                            <m:t>𝑐</m:t>
-                          </m:r>
-                          <m:r>
-                            <a:rPr lang="en-US" sz="1800" i="1">
-                              <a:latin typeface="Cambria Math" panose="02040503050406030204" pitchFamily="18" charset="0"/>
-                            </a:rPr>
-                            <m:t>)</m:t>
-                          </m:r>
-                        </m:e>
-                      </m:nary>
-                    </m:oMath>
-                  </m:oMathPara>
-                </a14:m>
-                <a:endParaRPr lang="en-US" sz="1800" dirty="0"/>
-              </a:p>
-            </p:txBody>
-          </p:sp>
-        </mc:Choice>
-        <mc:Fallback xmlns="">
-          <p:sp>
-            <p:nvSpPr>
-              <p:cNvPr id="5" name="Content Placeholder 4"/>
-              <p:cNvSpPr>
-                <a:spLocks noGrp="1" noRot="1" noChangeAspect="1" noMove="1" noResize="1" noEditPoints="1" noAdjustHandles="1" noChangeArrowheads="1" noChangeShapeType="1" noTextEdit="1"/>
-              </p:cNvSpPr>
-              <p:nvPr>
-                <p:ph idx="1"/>
-              </p:nvPr>
-            </p:nvSpPr>
-            <p:spPr>
-              <a:xfrm>
-                <a:off x="838200" y="1786809"/>
-                <a:ext cx="6054376" cy="4390154"/>
-              </a:xfrm>
-              <a:blipFill>
-                <a:blip r:embed="rId3"/>
-                <a:stretch>
-                  <a:fillRect l="-705" t="-694"/>
-                </a:stretch>
-              </a:blipFill>
-            </p:spPr>
-            <p:txBody>
-              <a:bodyPr/>
-              <a:lstStyle/>
-              <a:p>
-                <a:r>
-                  <a:rPr lang="en-US">
-                    <a:noFill/>
-                  </a:rPr>
-                  <a:t> </a:t>
-                </a:r>
-              </a:p>
-            </p:txBody>
-          </p:sp>
-        </mc:Fallback>
-      </mc:AlternateContent>
+      <p:sp>
+        <p:nvSpPr>
+          <p:cNvPr id="5" name="Content Placeholder 4"/>
+          <p:cNvSpPr>
+            <a:spLocks noGrp="1"/>
+          </p:cNvSpPr>
+          <p:nvPr>
+            <p:ph idx="1"/>
+          </p:nvPr>
+        </p:nvSpPr>
+        <p:spPr>
+          <a:xfrm>
+            <a:off x="838199" y="1786808"/>
+            <a:ext cx="6089839" cy="4375730"/>
+          </a:xfrm>
+        </p:spPr>
+        <p:txBody>
+          <a:bodyPr>
+            <a:noAutofit/>
+          </a:bodyPr>
+          <a:lstStyle/>
+          <a:p>
+            <a:pPr>
+              <a:lnSpc>
+                <a:spcPct val="100000"/>
+              </a:lnSpc>
+            </a:pPr>
+            <a:r>
+              <a:rPr lang="en-US" dirty="0"/>
+              <a:t>Often, we will use a matrix to represent a kernel with a fixed support.</a:t>
+            </a:r>
+          </a:p>
+          <a:p>
+            <a:pPr>
+              <a:lnSpc>
+                <a:spcPct val="100000"/>
+              </a:lnSpc>
+            </a:pPr>
+            <a:r>
+              <a:rPr lang="en-US" dirty="0"/>
+              <a:t>Hyper-Parameters</a:t>
+            </a:r>
+          </a:p>
+          <a:p>
+            <a:pPr lvl="1">
+              <a:lnSpc>
+                <a:spcPct val="100000"/>
+              </a:lnSpc>
+            </a:pPr>
+            <a:r>
+              <a:rPr lang="en-US" b="1" dirty="0"/>
+              <a:t>Kernel Size </a:t>
+            </a:r>
+            <a:r>
+              <a:rPr lang="en-US" dirty="0"/>
+              <a:t>– The dimensions of the Kernel</a:t>
+            </a:r>
+          </a:p>
+          <a:p>
+            <a:pPr lvl="1">
+              <a:lnSpc>
+                <a:spcPct val="100000"/>
+              </a:lnSpc>
+            </a:pPr>
+            <a:r>
+              <a:rPr lang="en-US" b="1" dirty="0"/>
+              <a:t>Stride</a:t>
+            </a:r>
+            <a:r>
+              <a:rPr lang="en-US" dirty="0"/>
+              <a:t> – Length of step when sliding the window</a:t>
+            </a:r>
+          </a:p>
+          <a:p>
+            <a:pPr lvl="1">
+              <a:lnSpc>
+                <a:spcPct val="100000"/>
+              </a:lnSpc>
+            </a:pPr>
+            <a:r>
+              <a:rPr lang="en-US" b="1" dirty="0"/>
+              <a:t>Zero Padding </a:t>
+            </a:r>
+            <a:r>
+              <a:rPr lang="en-US" dirty="0"/>
+              <a:t>– Whether zeros are added around the boundary</a:t>
+            </a:r>
+          </a:p>
+          <a:p>
+            <a:pPr>
+              <a:lnSpc>
+                <a:spcPct val="100000"/>
+              </a:lnSpc>
+            </a:pPr>
+            <a:r>
+              <a:rPr lang="en-US" dirty="0"/>
+              <a:t>Assuming Stride=1, the feature map is always smaller than the input. With Zero-Padding, it is possible to have the same size.</a:t>
+            </a:r>
+          </a:p>
+        </p:txBody>
+      </p:sp>
       <p:sp>
         <p:nvSpPr>
           <p:cNvPr id="4" name="Slide Number Placeholder 3"/>
@@ -32997,6 +32627,63 @@
           </a:p>
         </p:txBody>
       </p:sp>
+      <p:sp>
+        <p:nvSpPr>
+          <p:cNvPr id="16" name="Rectangle 15">
+            <a:extLst>
+              <a:ext uri="{FF2B5EF4-FFF2-40B4-BE49-F238E27FC236}">
+                <a16:creationId xmlns:a16="http://schemas.microsoft.com/office/drawing/2014/main" id="{AAC9E3EE-7370-D846-F800-A2A55A52C408}"/>
+              </a:ext>
+            </a:extLst>
+          </p:cNvPr>
+          <p:cNvSpPr/>
+          <p:nvPr/>
+        </p:nvSpPr>
+        <p:spPr>
+          <a:xfrm>
+            <a:off x="8896136" y="4066025"/>
+            <a:ext cx="266557" cy="259297"/>
+          </a:xfrm>
+          <a:prstGeom prst="rect">
+            <a:avLst/>
+          </a:prstGeom>
+          <a:solidFill>
+            <a:schemeClr val="accent1">
+              <a:alpha val="50000"/>
+            </a:schemeClr>
+          </a:solidFill>
+          <a:ln>
+            <a:noFill/>
+          </a:ln>
+        </p:spPr>
+        <p:style>
+          <a:lnRef idx="2">
+            <a:schemeClr val="accent1">
+              <a:shade val="50000"/>
+            </a:schemeClr>
+          </a:lnRef>
+          <a:fillRef idx="1">
+            <a:schemeClr val="accent1"/>
+          </a:fillRef>
+          <a:effectRef idx="0">
+            <a:schemeClr val="accent1"/>
+          </a:effectRef>
+          <a:fontRef idx="minor">
+            <a:schemeClr val="lt1"/>
+          </a:fontRef>
+        </p:style>
+        <p:txBody>
+          <a:bodyPr rtlCol="0" anchor="ctr"/>
+          <a:lstStyle/>
+          <a:p>
+            <a:pPr algn="ctr"/>
+            <a:r>
+              <a:rPr lang="en-US" dirty="0"/>
+              <a:t>1</a:t>
+            </a:r>
+          </a:p>
+        </p:txBody>
+      </p:sp>
     </p:spTree>
     <p:extLst>
       <p:ext uri="{BB962C8B-B14F-4D97-AF65-F5344CB8AC3E}">
@@ -33007,6 +32694,316 @@
   <p:clrMapOvr>
     <a:masterClrMapping/>
   </p:clrMapOvr>
+  <p:timing>
+    <p:tnLst>
+      <p:par>
+        <p:cTn id="1" dur="indefinite" restart="never" nodeType="tmRoot">
+          <p:childTnLst>
+            <p:seq concurrent="1" nextAc="seek">
+              <p:cTn id="2" dur="indefinite" nodeType="mainSeq">
+                <p:childTnLst>
+                  <p:par>
+                    <p:cTn id="3" fill="hold">
+                      <p:stCondLst>
+                        <p:cond delay="indefinite"/>
+                      </p:stCondLst>
+                      <p:childTnLst>
+                        <p:par>
+                          <p:cTn id="4" fill="hold">
+                            <p:stCondLst>
+                              <p:cond delay="0"/>
+                            </p:stCondLst>
+                            <p:childTnLst>
+                              <p:par>
+                                <p:cTn id="5" presetID="1" presetClass="entr" presetSubtype="0" fill="hold" grpId="0" nodeType="clickEffect">
+                                  <p:stCondLst>
+                                    <p:cond delay="0"/>
+                                  </p:stCondLst>
+                                  <p:childTnLst>
+                                    <p:set>
+                                      <p:cBhvr>
+                                        <p:cTn id="6" dur="1" fill="hold">
+                                          <p:stCondLst>
+                                            <p:cond delay="0"/>
+                                          </p:stCondLst>
+                                        </p:cTn>
+                                        <p:tgtEl>
+                                          <p:spTgt spid="20"/>
+                                        </p:tgtEl>
+                                        <p:attrNameLst>
+                                          <p:attrName>style.visibility</p:attrName>
+                                        </p:attrNameLst>
+                                      </p:cBhvr>
+                                      <p:to>
+                                        <p:strVal val="visible"/>
+                                      </p:to>
+                                    </p:set>
+                                  </p:childTnLst>
+                                </p:cTn>
+                              </p:par>
+                              <p:par>
+                                <p:cTn id="7" presetID="1" presetClass="entr" presetSubtype="0" fill="hold" grpId="0" nodeType="withEffect">
+                                  <p:stCondLst>
+                                    <p:cond delay="0"/>
+                                  </p:stCondLst>
+                                  <p:childTnLst>
+                                    <p:set>
+                                      <p:cBhvr>
+                                        <p:cTn id="8" dur="1" fill="hold">
+                                          <p:stCondLst>
+                                            <p:cond delay="0"/>
+                                          </p:stCondLst>
+                                        </p:cTn>
+                                        <p:tgtEl>
+                                          <p:spTgt spid="18"/>
+                                        </p:tgtEl>
+                                        <p:attrNameLst>
+                                          <p:attrName>style.visibility</p:attrName>
+                                        </p:attrNameLst>
+                                      </p:cBhvr>
+                                      <p:to>
+                                        <p:strVal val="visible"/>
+                                      </p:to>
+                                    </p:set>
+                                  </p:childTnLst>
+                                </p:cTn>
+                              </p:par>
+                            </p:childTnLst>
+                          </p:cTn>
+                        </p:par>
+                      </p:childTnLst>
+                    </p:cTn>
+                  </p:par>
+                  <p:par>
+                    <p:cTn id="9" fill="hold">
+                      <p:stCondLst>
+                        <p:cond delay="indefinite"/>
+                      </p:stCondLst>
+                      <p:childTnLst>
+                        <p:par>
+                          <p:cTn id="10" fill="hold">
+                            <p:stCondLst>
+                              <p:cond delay="0"/>
+                            </p:stCondLst>
+                            <p:childTnLst>
+                              <p:par>
+                                <p:cTn id="11" presetID="1" presetClass="entr" presetSubtype="0" fill="hold" grpId="0" nodeType="clickEffect">
+                                  <p:stCondLst>
+                                    <p:cond delay="0"/>
+                                  </p:stCondLst>
+                                  <p:childTnLst>
+                                    <p:set>
+                                      <p:cBhvr>
+                                        <p:cTn id="12" dur="1" fill="hold">
+                                          <p:stCondLst>
+                                            <p:cond delay="0"/>
+                                          </p:stCondLst>
+                                        </p:cTn>
+                                        <p:tgtEl>
+                                          <p:spTgt spid="16"/>
+                                        </p:tgtEl>
+                                        <p:attrNameLst>
+                                          <p:attrName>style.visibility</p:attrName>
+                                        </p:attrNameLst>
+                                      </p:cBhvr>
+                                      <p:to>
+                                        <p:strVal val="visible"/>
+                                      </p:to>
+                                    </p:set>
+                                  </p:childTnLst>
+                                </p:cTn>
+                              </p:par>
+                            </p:childTnLst>
+                          </p:cTn>
+                        </p:par>
+                      </p:childTnLst>
+                    </p:cTn>
+                  </p:par>
+                  <p:par>
+                    <p:cTn id="13" fill="hold">
+                      <p:stCondLst>
+                        <p:cond delay="indefinite"/>
+                      </p:stCondLst>
+                      <p:childTnLst>
+                        <p:par>
+                          <p:cTn id="14" fill="hold">
+                            <p:stCondLst>
+                              <p:cond delay="0"/>
+                            </p:stCondLst>
+                            <p:childTnLst>
+                              <p:par>
+                                <p:cTn id="15" presetID="1" presetClass="exit" presetSubtype="0" fill="hold" grpId="1" nodeType="clickEffect">
+                                  <p:stCondLst>
+                                    <p:cond delay="0"/>
+                                  </p:stCondLst>
+                                  <p:childTnLst>
+                                    <p:set>
+                                      <p:cBhvr>
+                                        <p:cTn id="16" dur="1" fill="hold">
+                                          <p:stCondLst>
+                                            <p:cond delay="0"/>
+                                          </p:stCondLst>
+                                        </p:cTn>
+                                        <p:tgtEl>
+                                          <p:spTgt spid="20"/>
+                                        </p:tgtEl>
+                                        <p:attrNameLst>
+                                          <p:attrName>style.visibility</p:attrName>
+                                        </p:attrNameLst>
+                                      </p:cBhvr>
+                                      <p:to>
+                                        <p:strVal val="hidden"/>
+                                      </p:to>
+                                    </p:set>
+                                  </p:childTnLst>
+                                </p:cTn>
+                              </p:par>
+                              <p:par>
+                                <p:cTn id="17" presetID="1" presetClass="exit" presetSubtype="0" fill="hold" grpId="1" nodeType="withEffect">
+                                  <p:stCondLst>
+                                    <p:cond delay="0"/>
+                                  </p:stCondLst>
+                                  <p:childTnLst>
+                                    <p:set>
+                                      <p:cBhvr>
+                                        <p:cTn id="18" dur="1" fill="hold">
+                                          <p:stCondLst>
+                                            <p:cond delay="0"/>
+                                          </p:stCondLst>
+                                        </p:cTn>
+                                        <p:tgtEl>
+                                          <p:spTgt spid="16"/>
+                                        </p:tgtEl>
+                                        <p:attrNameLst>
+                                          <p:attrName>style.visibility</p:attrName>
+                                        </p:attrNameLst>
+                                      </p:cBhvr>
+                                      <p:to>
+                                        <p:strVal val="hidden"/>
+                                      </p:to>
+                                    </p:set>
+                                  </p:childTnLst>
+                                </p:cTn>
+                              </p:par>
+                              <p:par>
+                                <p:cTn id="19" presetID="1" presetClass="exit" presetSubtype="0" fill="hold" grpId="1" nodeType="withEffect">
+                                  <p:stCondLst>
+                                    <p:cond delay="0"/>
+                                  </p:stCondLst>
+                                  <p:childTnLst>
+                                    <p:set>
+                                      <p:cBhvr>
+                                        <p:cTn id="20" dur="1" fill="hold">
+                                          <p:stCondLst>
+                                            <p:cond delay="0"/>
+                                          </p:stCondLst>
+                                        </p:cTn>
+                                        <p:tgtEl>
+                                          <p:spTgt spid="18"/>
+                                        </p:tgtEl>
+                                        <p:attrNameLst>
+                                          <p:attrName>style.visibility</p:attrName>
+                                        </p:attrNameLst>
+                                      </p:cBhvr>
+                                      <p:to>
+                                        <p:strVal val="hidden"/>
+                                      </p:to>
+                                    </p:set>
+                                  </p:childTnLst>
+                                </p:cTn>
+                              </p:par>
+                              <p:par>
+                                <p:cTn id="21" presetID="1" presetClass="entr" presetSubtype="0" fill="hold" grpId="0" nodeType="withEffect">
+                                  <p:stCondLst>
+                                    <p:cond delay="0"/>
+                                  </p:stCondLst>
+                                  <p:childTnLst>
+                                    <p:set>
+                                      <p:cBhvr>
+                                        <p:cTn id="22" dur="1" fill="hold">
+                                          <p:stCondLst>
+                                            <p:cond delay="0"/>
+                                          </p:stCondLst>
+                                        </p:cTn>
+                                        <p:tgtEl>
+                                          <p:spTgt spid="7"/>
+                                        </p:tgtEl>
+                                        <p:attrNameLst>
+                                          <p:attrName>style.visibility</p:attrName>
+                                        </p:attrNameLst>
+                                      </p:cBhvr>
+                                      <p:to>
+                                        <p:strVal val="visible"/>
+                                      </p:to>
+                                    </p:set>
+                                  </p:childTnLst>
+                                </p:cTn>
+                              </p:par>
+                              <p:par>
+                                <p:cTn id="23" presetID="1" presetClass="entr" presetSubtype="0" fill="hold" grpId="0" nodeType="withEffect">
+                                  <p:stCondLst>
+                                    <p:cond delay="0"/>
+                                  </p:stCondLst>
+                                  <p:childTnLst>
+                                    <p:set>
+                                      <p:cBhvr>
+                                        <p:cTn id="24" dur="1" fill="hold">
+                                          <p:stCondLst>
+                                            <p:cond delay="0"/>
+                                          </p:stCondLst>
+                                        </p:cTn>
+                                        <p:tgtEl>
+                                          <p:spTgt spid="9"/>
+                                        </p:tgtEl>
+                                        <p:attrNameLst>
+                                          <p:attrName>style.visibility</p:attrName>
+                                        </p:attrNameLst>
+                                      </p:cBhvr>
+                                      <p:to>
+                                        <p:strVal val="visible"/>
+                                      </p:to>
+                                    </p:set>
+                                  </p:childTnLst>
+                                </p:cTn>
+                              </p:par>
+                            </p:childTnLst>
+                          </p:cTn>
+                        </p:par>
+                      </p:childTnLst>
+                    </p:cTn>
+                  </p:par>
+                </p:childTnLst>
+              </p:cTn>
+              <p:prevCondLst>
+                <p:cond evt="onPrev" delay="0">
+                  <p:tgtEl>
+                    <p:sldTgt/>
+                  </p:tgtEl>
+                </p:cond>
+              </p:prevCondLst>
+              <p:nextCondLst>
+                <p:cond evt="onNext" delay="0">
+                  <p:tgtEl>
+                    <p:sldTgt/>
+                  </p:tgtEl>
+                </p:cond>
+              </p:nextCondLst>
+            </p:seq>
+          </p:childTnLst>
+        </p:cTn>
+      </p:par>
+    </p:tnLst>
+    <p:bldLst>
+      <p:bldP spid="7" grpId="0" animBg="1"/>
+      <p:bldP spid="9" grpId="0" animBg="1"/>
+      <p:bldP spid="18" grpId="0" animBg="1"/>
+      <p:bldP spid="18" grpId="1" animBg="1"/>
+      <p:bldP spid="20" grpId="0" animBg="1"/>
+      <p:bldP spid="20" grpId="1" animBg="1"/>
+      <p:bldP spid="16" grpId="0" animBg="1"/>
+      <p:bldP spid="16" grpId="1" animBg="1"/>
+    </p:bldLst>
+  </p:timing>
 </p:sld>
 </file>
 
@@ -33045,18 +33042,20 @@
         </p:nvSpPr>
         <p:spPr>
           <a:xfrm>
-            <a:off x="838200" y="1664134"/>
-            <a:ext cx="10515600" cy="995226"/>
+            <a:off x="10194713" y="1373883"/>
+            <a:ext cx="1421599" cy="995226"/>
           </a:xfrm>
         </p:spPr>
         <p:txBody>
-          <a:bodyPr/>
+          <a:bodyPr>
+            <a:normAutofit/>
+          </a:bodyPr>
           <a:lstStyle/>
           <a:p>
             <a:pPr algn="r"/>
             <a:r>
-              <a:rPr lang="en-US" dirty="0"/>
-              <a:t>Convolution</a:t>
+              <a:rPr lang="en-US" sz="2400" b="1" dirty="0"/>
+              <a:t>Example.</a:t>
             </a:r>
           </a:p>
         </p:txBody>
@@ -33228,609 +33227,6 @@
           </a:p>
         </p:txBody>
       </p:sp>
-      <mc:AlternateContent xmlns:mc="http://schemas.openxmlformats.org/markup-compatibility/2006" xmlns:a14="http://schemas.microsoft.com/office/drawing/2010/main">
-        <mc:Choice Requires="a14">
-          <p:sp>
-            <p:nvSpPr>
-              <p:cNvPr id="16" name="Content Placeholder 4">
-                <a:extLst>
-                  <a:ext uri="{FF2B5EF4-FFF2-40B4-BE49-F238E27FC236}">
-                    <a16:creationId xmlns:a16="http://schemas.microsoft.com/office/drawing/2014/main" id="{EEFE5E5D-C569-4990-B98C-D557DB876FB4}"/>
-                  </a:ext>
-                </a:extLst>
-              </p:cNvPr>
-              <p:cNvSpPr txBox="1">
-                <a:spLocks/>
-              </p:cNvSpPr>
-              <p:nvPr/>
-            </p:nvSpPr>
-            <p:spPr bwMode="auto">
-              <a:xfrm>
-                <a:off x="5065948" y="4827719"/>
-                <a:ext cx="6921244" cy="1417352"/>
-              </a:xfrm>
-              <a:prstGeom prst="rect">
-                <a:avLst/>
-              </a:prstGeom>
-              <a:noFill/>
-              <a:ln>
-                <a:noFill/>
-              </a:ln>
-              <a:extLst>
-                <a:ext uri="{909E8E84-426E-40dd-AFC4-6F175D3DCCD1}">
-                  <a14:hiddenFill xmlns="">
-                    <a:solidFill>
-                      <a:srgbClr val="FFFFFF"/>
-                    </a:solidFill>
-                  </a14:hiddenFill>
-                </a:ext>
-                <a:ext uri="{91240B29-F687-4f45-9708-019B960494DF}">
-                  <a14:hiddenLine xmlns="" w="9525">
-                    <a:solidFill>
-                      <a:srgbClr val="000000"/>
-                    </a:solidFill>
-                    <a:miter lim="800000"/>
-                    <a:headEnd/>
-                    <a:tailEnd/>
-                  </a14:hiddenLine>
-                </a:ext>
-                <a:ext uri="{FAA26D3D-D897-4be2-8F04-BA451C77F1D7}">
-                  <ma14:placeholderFlag xmlns:ma14="http://schemas.microsoft.com/office/mac/drawingml/2011/main" xmlns="" val="1"/>
-                </a:ext>
-              </a:extLst>
-            </p:spPr>
-            <p:txBody>
-              <a:bodyPr vert="horz" wrap="square" lIns="91440" tIns="45720" rIns="91440" bIns="45720" numCol="1" anchor="t" anchorCtr="0" compatLnSpc="1">
-                <a:prstTxWarp prst="textNoShape">
-                  <a:avLst/>
-                </a:prstTxWarp>
-              </a:bodyPr>
-              <a:lstStyle>
-                <a:lvl1pPr marL="342900" indent="-342900" algn="l" defTabSz="457200" rtl="0" eaLnBrk="1" fontAlgn="base" hangingPunct="1">
-                  <a:spcBef>
-                    <a:spcPct val="20000"/>
-                  </a:spcBef>
-                  <a:spcAft>
-                    <a:spcPct val="0"/>
-                  </a:spcAft>
-                  <a:buFont typeface="Wingdings" panose="05000000000000000000" pitchFamily="2" charset="2"/>
-                  <a:buChar char="§"/>
-                  <a:defRPr sz="2000" kern="1200">
-                    <a:solidFill>
-                      <a:schemeClr val="tx1"/>
-                    </a:solidFill>
-                    <a:latin typeface="+mn-lt"/>
-                    <a:ea typeface="ＭＳ Ｐゴシック" charset="0"/>
-                    <a:cs typeface="Arial"/>
-                  </a:defRPr>
-                </a:lvl1pPr>
-                <a:lvl2pPr marL="742950" indent="-285750" algn="l" defTabSz="457200" rtl="0" eaLnBrk="1" fontAlgn="base" hangingPunct="1">
-                  <a:spcBef>
-                    <a:spcPct val="20000"/>
-                  </a:spcBef>
-                  <a:spcAft>
-                    <a:spcPct val="0"/>
-                  </a:spcAft>
-                  <a:buFont typeface="Arial" charset="0"/>
-                  <a:buChar char="–"/>
-                  <a:defRPr sz="1800" kern="1200">
-                    <a:solidFill>
-                      <a:schemeClr val="tx1"/>
-                    </a:solidFill>
-                    <a:latin typeface="+mn-lt"/>
-                    <a:ea typeface="ＭＳ Ｐゴシック" charset="0"/>
-                    <a:cs typeface="Arial"/>
-                  </a:defRPr>
-                </a:lvl2pPr>
-                <a:lvl3pPr marL="1143000" indent="-228600" algn="l" defTabSz="457200" rtl="0" eaLnBrk="1" fontAlgn="base" hangingPunct="1">
-                  <a:spcBef>
-                    <a:spcPct val="20000"/>
-                  </a:spcBef>
-                  <a:spcAft>
-                    <a:spcPct val="0"/>
-                  </a:spcAft>
-                  <a:buFont typeface="Arial" charset="0"/>
-                  <a:buChar char="•"/>
-                  <a:defRPr sz="1600" kern="1200">
-                    <a:solidFill>
-                      <a:schemeClr val="tx1"/>
-                    </a:solidFill>
-                    <a:latin typeface="+mn-lt"/>
-                    <a:ea typeface="ＭＳ Ｐゴシック" charset="0"/>
-                    <a:cs typeface="Arial"/>
-                  </a:defRPr>
-                </a:lvl3pPr>
-                <a:lvl4pPr marL="1600200" indent="-228600" algn="l" defTabSz="457200" rtl="0" eaLnBrk="1" fontAlgn="base" hangingPunct="1">
-                  <a:spcBef>
-                    <a:spcPct val="20000"/>
-                  </a:spcBef>
-                  <a:spcAft>
-                    <a:spcPct val="0"/>
-                  </a:spcAft>
-                  <a:buFont typeface="Arial" charset="0"/>
-                  <a:buChar char="–"/>
-                  <a:defRPr sz="1200" kern="1200">
-                    <a:solidFill>
-                      <a:schemeClr val="tx1"/>
-                    </a:solidFill>
-                    <a:latin typeface="+mn-lt"/>
-                    <a:ea typeface="ＭＳ Ｐゴシック" charset="0"/>
-                    <a:cs typeface="Arial"/>
-                  </a:defRPr>
-                </a:lvl4pPr>
-                <a:lvl5pPr marL="2057400" indent="-228600" algn="l" defTabSz="457200" rtl="0" eaLnBrk="1" fontAlgn="base" hangingPunct="1">
-                  <a:spcBef>
-                    <a:spcPct val="20000"/>
-                  </a:spcBef>
-                  <a:spcAft>
-                    <a:spcPct val="0"/>
-                  </a:spcAft>
-                  <a:buFont typeface="Arial" charset="0"/>
-                  <a:buChar char="»"/>
-                  <a:defRPr sz="900" kern="1200">
-                    <a:solidFill>
-                      <a:schemeClr val="tx1"/>
-                    </a:solidFill>
-                    <a:latin typeface="+mn-lt"/>
-                    <a:ea typeface="ＭＳ Ｐゴシック" charset="0"/>
-                    <a:cs typeface="Arial"/>
-                  </a:defRPr>
-                </a:lvl5pPr>
-                <a:lvl6pPr marL="2514600" indent="-228600" algn="l" defTabSz="457200" rtl="0" eaLnBrk="1" latinLnBrk="0" hangingPunct="1">
-                  <a:spcBef>
-                    <a:spcPct val="20000"/>
-                  </a:spcBef>
-                  <a:buFont typeface="Arial"/>
-                  <a:buChar char="•"/>
-                  <a:defRPr sz="2000" kern="1200">
-                    <a:solidFill>
-                      <a:schemeClr val="tx1"/>
-                    </a:solidFill>
-                    <a:latin typeface="+mn-lt"/>
-                    <a:ea typeface="+mn-ea"/>
-                    <a:cs typeface="+mn-cs"/>
-                  </a:defRPr>
-                </a:lvl6pPr>
-                <a:lvl7pPr marL="2971800" indent="-228600" algn="l" defTabSz="457200" rtl="0" eaLnBrk="1" latinLnBrk="0" hangingPunct="1">
-                  <a:spcBef>
-                    <a:spcPct val="20000"/>
-                  </a:spcBef>
-                  <a:buFont typeface="Arial"/>
-                  <a:buChar char="•"/>
-                  <a:defRPr sz="2000" kern="1200">
-                    <a:solidFill>
-                      <a:schemeClr val="tx1"/>
-                    </a:solidFill>
-                    <a:latin typeface="+mn-lt"/>
-                    <a:ea typeface="+mn-ea"/>
-                    <a:cs typeface="+mn-cs"/>
-                  </a:defRPr>
-                </a:lvl7pPr>
-                <a:lvl8pPr marL="3429000" indent="-228600" algn="l" defTabSz="457200" rtl="0" eaLnBrk="1" latinLnBrk="0" hangingPunct="1">
-                  <a:spcBef>
-                    <a:spcPct val="20000"/>
-                  </a:spcBef>
-                  <a:buFont typeface="Arial"/>
-                  <a:buChar char="•"/>
-                  <a:defRPr sz="2000" kern="1200">
-                    <a:solidFill>
-                      <a:schemeClr val="tx1"/>
-                    </a:solidFill>
-                    <a:latin typeface="+mn-lt"/>
-                    <a:ea typeface="+mn-ea"/>
-                    <a:cs typeface="+mn-cs"/>
-                  </a:defRPr>
-                </a:lvl8pPr>
-                <a:lvl9pPr marL="3886200" indent="-228600" algn="l" defTabSz="457200" rtl="0" eaLnBrk="1" latinLnBrk="0" hangingPunct="1">
-                  <a:spcBef>
-                    <a:spcPct val="20000"/>
-                  </a:spcBef>
-                  <a:buFont typeface="Arial"/>
-                  <a:buChar char="•"/>
-                  <a:defRPr sz="2000" kern="1200">
-                    <a:solidFill>
-                      <a:schemeClr val="tx1"/>
-                    </a:solidFill>
-                    <a:latin typeface="+mn-lt"/>
-                    <a:ea typeface="+mn-ea"/>
-                    <a:cs typeface="+mn-cs"/>
-                  </a:defRPr>
-                </a:lvl9pPr>
-              </a:lstStyle>
-              <a:p>
-                <a:pPr>
-                  <a:lnSpc>
-                    <a:spcPct val="100000"/>
-                  </a:lnSpc>
-                </a:pPr>
-                <a:r>
-                  <a:rPr lang="en-US" sz="2000" dirty="0"/>
-                  <a:t>For multi-channel </a:t>
-                </a:r>
-                <a14:m>
-                  <m:oMath xmlns:m="http://schemas.openxmlformats.org/officeDocument/2006/math">
-                    <m:r>
-                      <a:rPr lang="en-US" sz="2000" i="1">
-                        <a:latin typeface="Cambria Math" panose="02040503050406030204" pitchFamily="18" charset="0"/>
-                      </a:rPr>
-                      <m:t>𝑥</m:t>
-                    </m:r>
-                  </m:oMath>
-                </a14:m>
-                <a:r>
-                  <a:rPr lang="en-US" sz="2000" dirty="0"/>
-                  <a:t>, we use a multi-channel kernel:</a:t>
-                </a:r>
-              </a:p>
-              <a:p>
-                <a:pPr marL="0" indent="0">
-                  <a:lnSpc>
-                    <a:spcPct val="100000"/>
-                  </a:lnSpc>
-                  <a:buNone/>
-                </a:pPr>
-                <a14:m>
-                  <m:oMathPara xmlns:m="http://schemas.openxmlformats.org/officeDocument/2006/math">
-                    <m:oMathParaPr>
-                      <m:jc m:val="centerGroup"/>
-                    </m:oMathParaPr>
-                    <m:oMath xmlns:m="http://schemas.openxmlformats.org/officeDocument/2006/math">
-                      <m:r>
-                        <a:rPr lang="en-US" sz="2000" i="1">
-                          <a:latin typeface="Cambria Math" panose="02040503050406030204" pitchFamily="18" charset="0"/>
-                        </a:rPr>
-                        <m:t>𝐹</m:t>
-                      </m:r>
-                      <m:d>
-                        <m:dPr>
-                          <m:ctrlPr>
-                            <a:rPr lang="en-US" sz="2000" i="1">
-                              <a:latin typeface="Cambria Math" panose="02040503050406030204" pitchFamily="18" charset="0"/>
-                            </a:rPr>
-                          </m:ctrlPr>
-                        </m:dPr>
-                        <m:e>
-                          <m:r>
-                            <a:rPr lang="en-US" sz="2000" i="1">
-                              <a:latin typeface="Cambria Math" panose="02040503050406030204" pitchFamily="18" charset="0"/>
-                            </a:rPr>
-                            <m:t>𝑖</m:t>
-                          </m:r>
-                          <m:r>
-                            <a:rPr lang="en-US" sz="2000" i="1">
-                              <a:latin typeface="Cambria Math" panose="02040503050406030204" pitchFamily="18" charset="0"/>
-                            </a:rPr>
-                            <m:t>,</m:t>
-                          </m:r>
-                          <m:r>
-                            <a:rPr lang="en-US" sz="2000" i="1">
-                              <a:latin typeface="Cambria Math" panose="02040503050406030204" pitchFamily="18" charset="0"/>
-                            </a:rPr>
-                            <m:t>𝑗</m:t>
-                          </m:r>
-                        </m:e>
-                      </m:d>
-                      <m:r>
-                        <a:rPr lang="en-US" sz="2000" i="1">
-                          <a:latin typeface="Cambria Math" panose="02040503050406030204" pitchFamily="18" charset="0"/>
-                        </a:rPr>
-                        <m:t>=</m:t>
-                      </m:r>
-                      <m:d>
-                        <m:dPr>
-                          <m:begChr m:val="["/>
-                          <m:endChr m:val="]"/>
-                          <m:ctrlPr>
-                            <a:rPr lang="en-US" sz="2000" i="1">
-                              <a:latin typeface="Cambria Math" panose="02040503050406030204" pitchFamily="18" charset="0"/>
-                            </a:rPr>
-                          </m:ctrlPr>
-                        </m:dPr>
-                        <m:e>
-                          <m:r>
-                            <a:rPr lang="en-US" sz="2000" i="1">
-                              <a:latin typeface="Cambria Math" panose="02040503050406030204" pitchFamily="18" charset="0"/>
-                            </a:rPr>
-                            <m:t>𝑋</m:t>
-                          </m:r>
-                          <m:r>
-                            <a:rPr lang="en-US" sz="2000" i="1">
-                              <a:latin typeface="Cambria Math" panose="02040503050406030204" pitchFamily="18" charset="0"/>
-                            </a:rPr>
-                            <m:t>∗</m:t>
-                          </m:r>
-                          <m:r>
-                            <a:rPr lang="en-US" sz="2000" i="1">
-                              <a:latin typeface="Cambria Math" panose="02040503050406030204" pitchFamily="18" charset="0"/>
-                            </a:rPr>
-                            <m:t>𝐾</m:t>
-                          </m:r>
-                        </m:e>
-                      </m:d>
-                      <m:d>
-                        <m:dPr>
-                          <m:ctrlPr>
-                            <a:rPr lang="en-US" sz="2000" i="1">
-                              <a:latin typeface="Cambria Math" panose="02040503050406030204" pitchFamily="18" charset="0"/>
-                            </a:rPr>
-                          </m:ctrlPr>
-                        </m:dPr>
-                        <m:e>
-                          <m:r>
-                            <a:rPr lang="en-US" sz="2000" i="1">
-                              <a:latin typeface="Cambria Math" panose="02040503050406030204" pitchFamily="18" charset="0"/>
-                            </a:rPr>
-                            <m:t>𝑖</m:t>
-                          </m:r>
-                          <m:r>
-                            <a:rPr lang="en-US" sz="2000" i="1">
-                              <a:latin typeface="Cambria Math" panose="02040503050406030204" pitchFamily="18" charset="0"/>
-                            </a:rPr>
-                            <m:t>,</m:t>
-                          </m:r>
-                          <m:r>
-                            <a:rPr lang="en-US" sz="2000" i="1">
-                              <a:latin typeface="Cambria Math" panose="02040503050406030204" pitchFamily="18" charset="0"/>
-                            </a:rPr>
-                            <m:t>𝑗</m:t>
-                          </m:r>
-                        </m:e>
-                      </m:d>
-                      <m:r>
-                        <a:rPr lang="en-US" sz="2000" i="1">
-                          <a:latin typeface="Cambria Math" panose="02040503050406030204" pitchFamily="18" charset="0"/>
-                        </a:rPr>
-                        <m:t>=</m:t>
-                      </m:r>
-                      <m:nary>
-                        <m:naryPr>
-                          <m:chr m:val="∑"/>
-                          <m:supHide m:val="on"/>
-                          <m:ctrlPr>
-                            <a:rPr lang="en-US" sz="2000" i="1">
-                              <a:latin typeface="Cambria Math" panose="02040503050406030204" pitchFamily="18" charset="0"/>
-                            </a:rPr>
-                          </m:ctrlPr>
-                        </m:naryPr>
-                        <m:sub>
-                          <m:r>
-                            <a:rPr lang="en-US" sz="2000" i="1">
-                              <a:latin typeface="Cambria Math" panose="02040503050406030204" pitchFamily="18" charset="0"/>
-                            </a:rPr>
-                            <m:t>𝑝</m:t>
-                          </m:r>
-                          <m:r>
-                            <a:rPr lang="en-US" sz="2000" i="1">
-                              <a:latin typeface="Cambria Math" panose="02040503050406030204" pitchFamily="18" charset="0"/>
-                            </a:rPr>
-                            <m:t>,</m:t>
-                          </m:r>
-                          <m:r>
-                            <a:rPr lang="en-US" sz="2000" i="1">
-                              <a:latin typeface="Cambria Math" panose="02040503050406030204" pitchFamily="18" charset="0"/>
-                            </a:rPr>
-                            <m:t>𝑞</m:t>
-                          </m:r>
-                          <m:r>
-                            <a:rPr lang="en-US" sz="2000" i="1">
-                              <a:latin typeface="Cambria Math" panose="02040503050406030204" pitchFamily="18" charset="0"/>
-                            </a:rPr>
-                            <m:t>,</m:t>
-                          </m:r>
-                          <m:r>
-                            <a:rPr lang="en-US" sz="2000" i="1">
-                              <a:latin typeface="Cambria Math" panose="02040503050406030204" pitchFamily="18" charset="0"/>
-                            </a:rPr>
-                            <m:t>𝑐</m:t>
-                          </m:r>
-                        </m:sub>
-                        <m:sup/>
-                        <m:e>
-                          <m:r>
-                            <a:rPr lang="en-US" sz="2000" i="1">
-                              <a:latin typeface="Cambria Math" panose="02040503050406030204" pitchFamily="18" charset="0"/>
-                            </a:rPr>
-                            <m:t>𝑋</m:t>
-                          </m:r>
-                          <m:d>
-                            <m:dPr>
-                              <m:ctrlPr>
-                                <a:rPr lang="en-US" sz="2000" i="1">
-                                  <a:latin typeface="Cambria Math" panose="02040503050406030204" pitchFamily="18" charset="0"/>
-                                </a:rPr>
-                              </m:ctrlPr>
-                            </m:dPr>
-                            <m:e>
-                              <m:r>
-                                <a:rPr lang="en-US" sz="2000" i="1">
-                                  <a:latin typeface="Cambria Math" panose="02040503050406030204" pitchFamily="18" charset="0"/>
-                                </a:rPr>
-                                <m:t>𝑝</m:t>
-                              </m:r>
-                              <m:r>
-                                <a:rPr lang="en-US" sz="2000" i="1">
-                                  <a:latin typeface="Cambria Math" panose="02040503050406030204" pitchFamily="18" charset="0"/>
-                                </a:rPr>
-                                <m:t>,</m:t>
-                              </m:r>
-                              <m:r>
-                                <a:rPr lang="en-US" sz="2000" i="1">
-                                  <a:latin typeface="Cambria Math" panose="02040503050406030204" pitchFamily="18" charset="0"/>
-                                </a:rPr>
-                                <m:t>𝑞</m:t>
-                              </m:r>
-                              <m:r>
-                                <a:rPr lang="en-US" sz="2000" i="1">
-                                  <a:latin typeface="Cambria Math" panose="02040503050406030204" pitchFamily="18" charset="0"/>
-                                </a:rPr>
-                                <m:t>,</m:t>
-                              </m:r>
-                              <m:r>
-                                <a:rPr lang="en-US" sz="2000" i="1">
-                                  <a:latin typeface="Cambria Math" panose="02040503050406030204" pitchFamily="18" charset="0"/>
-                                </a:rPr>
-                                <m:t>𝑐</m:t>
-                              </m:r>
-                            </m:e>
-                          </m:d>
-                          <m:r>
-                            <a:rPr lang="en-US" sz="2000" i="1">
-                              <a:latin typeface="Cambria Math" panose="02040503050406030204" pitchFamily="18" charset="0"/>
-                            </a:rPr>
-                            <m:t>⋅</m:t>
-                          </m:r>
-                          <m:r>
-                            <a:rPr lang="en-US" sz="2000" i="1">
-                              <a:latin typeface="Cambria Math" panose="02040503050406030204" pitchFamily="18" charset="0"/>
-                            </a:rPr>
-                            <m:t>𝐾</m:t>
-                          </m:r>
-                          <m:r>
-                            <a:rPr lang="en-US" sz="2000" i="1">
-                              <a:latin typeface="Cambria Math" panose="02040503050406030204" pitchFamily="18" charset="0"/>
-                            </a:rPr>
-                            <m:t>(</m:t>
-                          </m:r>
-                          <m:r>
-                            <a:rPr lang="en-US" sz="2000" i="1">
-                              <a:latin typeface="Cambria Math" panose="02040503050406030204" pitchFamily="18" charset="0"/>
-                            </a:rPr>
-                            <m:t>𝑖</m:t>
-                          </m:r>
-                          <m:r>
-                            <a:rPr lang="en-US" sz="2000" i="1">
-                              <a:latin typeface="Cambria Math" panose="02040503050406030204" pitchFamily="18" charset="0"/>
-                            </a:rPr>
-                            <m:t>−</m:t>
-                          </m:r>
-                          <m:r>
-                            <a:rPr lang="en-US" sz="2000" i="1">
-                              <a:latin typeface="Cambria Math" panose="02040503050406030204" pitchFamily="18" charset="0"/>
-                            </a:rPr>
-                            <m:t>𝑝</m:t>
-                          </m:r>
-                          <m:r>
-                            <a:rPr lang="en-US" sz="2000" i="1">
-                              <a:latin typeface="Cambria Math" panose="02040503050406030204" pitchFamily="18" charset="0"/>
-                            </a:rPr>
-                            <m:t>,</m:t>
-                          </m:r>
-                          <m:r>
-                            <a:rPr lang="en-US" sz="2000" i="1">
-                              <a:latin typeface="Cambria Math" panose="02040503050406030204" pitchFamily="18" charset="0"/>
-                            </a:rPr>
-                            <m:t>𝑗</m:t>
-                          </m:r>
-                          <m:r>
-                            <a:rPr lang="en-US" sz="2000" i="1">
-                              <a:latin typeface="Cambria Math" panose="02040503050406030204" pitchFamily="18" charset="0"/>
-                            </a:rPr>
-                            <m:t>−</m:t>
-                          </m:r>
-                          <m:r>
-                            <a:rPr lang="en-US" sz="2000" i="1">
-                              <a:latin typeface="Cambria Math" panose="02040503050406030204" pitchFamily="18" charset="0"/>
-                            </a:rPr>
-                            <m:t>𝑞</m:t>
-                          </m:r>
-                          <m:r>
-                            <a:rPr lang="en-US" sz="2000" i="1">
-                              <a:latin typeface="Cambria Math" panose="02040503050406030204" pitchFamily="18" charset="0"/>
-                            </a:rPr>
-                            <m:t>,</m:t>
-                          </m:r>
-                          <m:r>
-                            <a:rPr lang="en-US" sz="2000" i="1">
-                              <a:latin typeface="Cambria Math" panose="02040503050406030204" pitchFamily="18" charset="0"/>
-                            </a:rPr>
-                            <m:t>𝑐</m:t>
-                          </m:r>
-                          <m:r>
-                            <a:rPr lang="en-US" sz="2000" i="1">
-                              <a:latin typeface="Cambria Math" panose="02040503050406030204" pitchFamily="18" charset="0"/>
-                            </a:rPr>
-                            <m:t>)</m:t>
-                          </m:r>
-                        </m:e>
-                      </m:nary>
-                    </m:oMath>
-                  </m:oMathPara>
-                </a14:m>
-                <a:endParaRPr lang="en-US" sz="2000" dirty="0"/>
-              </a:p>
-            </p:txBody>
-          </p:sp>
-        </mc:Choice>
-        <mc:Fallback xmlns="">
-          <p:sp>
-            <p:nvSpPr>
-              <p:cNvPr id="16" name="Content Placeholder 4">
-                <a:extLst>
-                  <a:ext uri="{FF2B5EF4-FFF2-40B4-BE49-F238E27FC236}">
-                    <a16:creationId xmlns:a16="http://schemas.microsoft.com/office/drawing/2014/main" id="{EEFE5E5D-C569-4990-B98C-D557DB876FB4}"/>
-                  </a:ext>
-                </a:extLst>
-              </p:cNvPr>
-              <p:cNvSpPr txBox="1">
-                <a:spLocks noRot="1" noChangeAspect="1" noMove="1" noResize="1" noEditPoints="1" noAdjustHandles="1" noChangeArrowheads="1" noChangeShapeType="1" noTextEdit="1"/>
-              </p:cNvSpPr>
-              <p:nvPr/>
-            </p:nvSpPr>
-            <p:spPr bwMode="auto">
-              <a:xfrm>
-                <a:off x="5065948" y="4827719"/>
-                <a:ext cx="6921244" cy="1417352"/>
-              </a:xfrm>
-              <a:prstGeom prst="rect">
-                <a:avLst/>
-              </a:prstGeom>
-              <a:blipFill>
-                <a:blip r:embed="rId5"/>
-                <a:stretch>
-                  <a:fillRect l="-793" t="-2586"/>
-                </a:stretch>
-              </a:blipFill>
-              <a:ln>
-                <a:noFill/>
-              </a:ln>
-              <a:extLst>
-                <a:ext uri="{909E8E84-426E-40dd-AFC4-6F175D3DCCD1}">
-                  <a14:hiddenFill xmlns="" xmlns:a14="http://schemas.microsoft.com/office/drawing/2010/main">
-                    <a:solidFill>
-                      <a:srgbClr val="FFFFFF"/>
-                    </a:solidFill>
-                  </a14:hiddenFill>
-                </a:ext>
-                <a:ext uri="{91240B29-F687-4f45-9708-019B960494DF}">
-                  <a14:hiddenLine xmlns="" xmlns:a14="http://schemas.microsoft.com/office/drawing/2010/main" w="9525">
-                    <a:solidFill>
-                      <a:srgbClr val="000000"/>
-                    </a:solidFill>
-                    <a:miter lim="800000"/>
-                    <a:headEnd/>
-                    <a:tailEnd/>
-                  </a14:hiddenLine>
-                </a:ext>
-                <a:ext uri="{FAA26D3D-D897-4be2-8F04-BA451C77F1D7}">
-                  <ma14:placeholderFlag xmlns="" xmlns:ma14="http://schemas.microsoft.com/office/mac/drawingml/2011/main" val="1"/>
-                </a:ext>
-              </a:extLst>
-            </p:spPr>
-            <p:txBody>
-              <a:bodyPr/>
-              <a:lstStyle/>
-              <a:p>
-                <a:r>
-                  <a:rPr lang="en-US">
-                    <a:noFill/>
-                  </a:rPr>
-                  <a:t> </a:t>
-                </a:r>
-              </a:p>
-            </p:txBody>
-          </p:sp>
-        </mc:Fallback>
-      </mc:AlternateContent>
       <p:sp>
         <p:nvSpPr>
           <p:cNvPr id="9" name="Rectangle 8">
@@ -33869,6 +33265,515 @@
           </a:p>
         </p:txBody>
       </p:sp>
+      <mc:AlternateContent xmlns:mc="http://schemas.openxmlformats.org/markup-compatibility/2006" xmlns:a14="http://schemas.microsoft.com/office/drawing/2010/main">
+        <mc:Choice Requires="a14">
+          <p:sp>
+            <p:nvSpPr>
+              <p:cNvPr id="5" name="Content Placeholder 4">
+                <a:extLst>
+                  <a:ext uri="{FF2B5EF4-FFF2-40B4-BE49-F238E27FC236}">
+                    <a16:creationId xmlns:a16="http://schemas.microsoft.com/office/drawing/2014/main" id="{8D31EDED-9C58-E4E1-E582-0A6E0F5E7DB6}"/>
+                  </a:ext>
+                </a:extLst>
+              </p:cNvPr>
+              <p:cNvSpPr txBox="1">
+                <a:spLocks/>
+              </p:cNvSpPr>
+              <p:nvPr/>
+            </p:nvSpPr>
+            <p:spPr>
+              <a:xfrm>
+                <a:off x="5362451" y="4583605"/>
+                <a:ext cx="6496297" cy="1437519"/>
+              </a:xfrm>
+              <a:prstGeom prst="rect">
+                <a:avLst/>
+              </a:prstGeom>
+            </p:spPr>
+            <p:txBody>
+              <a:bodyPr vert="horz" lIns="91440" tIns="45720" rIns="91440" bIns="45720" rtlCol="0">
+                <a:noAutofit/>
+              </a:bodyPr>
+              <a:lstStyle>
+                <a:lvl1pPr marL="228600" indent="-228600" algn="l" defTabSz="914400" rtl="0" eaLnBrk="1" latinLnBrk="0" hangingPunct="1">
+                  <a:lnSpc>
+                    <a:spcPct val="90000"/>
+                  </a:lnSpc>
+                  <a:spcBef>
+                    <a:spcPts val="1000"/>
+                  </a:spcBef>
+                  <a:buFont typeface="Wingdings" panose="05000000000000000000" pitchFamily="2" charset="2"/>
+                  <a:buChar char="§"/>
+                  <a:defRPr sz="2400" kern="1200">
+                    <a:solidFill>
+                      <a:schemeClr val="tx1"/>
+                    </a:solidFill>
+                    <a:latin typeface="+mn-lt"/>
+                    <a:ea typeface="+mn-ea"/>
+                    <a:cs typeface="+mn-cs"/>
+                  </a:defRPr>
+                </a:lvl1pPr>
+                <a:lvl2pPr marL="685800" indent="-228600" algn="l" defTabSz="914400" rtl="0" eaLnBrk="1" latinLnBrk="0" hangingPunct="1">
+                  <a:lnSpc>
+                    <a:spcPct val="90000"/>
+                  </a:lnSpc>
+                  <a:spcBef>
+                    <a:spcPts val="500"/>
+                  </a:spcBef>
+                  <a:buFont typeface="Wingdings" panose="05000000000000000000" pitchFamily="2" charset="2"/>
+                  <a:buChar char="§"/>
+                  <a:defRPr sz="2000" kern="1200">
+                    <a:solidFill>
+                      <a:schemeClr val="tx1"/>
+                    </a:solidFill>
+                    <a:latin typeface="+mn-lt"/>
+                    <a:ea typeface="+mn-ea"/>
+                    <a:cs typeface="+mn-cs"/>
+                  </a:defRPr>
+                </a:lvl2pPr>
+                <a:lvl3pPr marL="1143000" indent="-228600" algn="l" defTabSz="914400" rtl="0" eaLnBrk="1" latinLnBrk="0" hangingPunct="1">
+                  <a:lnSpc>
+                    <a:spcPct val="90000"/>
+                  </a:lnSpc>
+                  <a:spcBef>
+                    <a:spcPts val="500"/>
+                  </a:spcBef>
+                  <a:buFont typeface="Wingdings" panose="05000000000000000000" pitchFamily="2" charset="2"/>
+                  <a:buChar char="§"/>
+                  <a:defRPr sz="1800" kern="1200">
+                    <a:solidFill>
+                      <a:schemeClr val="tx1"/>
+                    </a:solidFill>
+                    <a:latin typeface="+mn-lt"/>
+                    <a:ea typeface="+mn-ea"/>
+                    <a:cs typeface="+mn-cs"/>
+                  </a:defRPr>
+                </a:lvl3pPr>
+                <a:lvl4pPr marL="1600200" indent="-228600" algn="l" defTabSz="914400" rtl="0" eaLnBrk="1" latinLnBrk="0" hangingPunct="1">
+                  <a:lnSpc>
+                    <a:spcPct val="90000"/>
+                  </a:lnSpc>
+                  <a:spcBef>
+                    <a:spcPts val="500"/>
+                  </a:spcBef>
+                  <a:buFont typeface="Wingdings" panose="05000000000000000000" pitchFamily="2" charset="2"/>
+                  <a:buChar char="§"/>
+                  <a:defRPr sz="1600" kern="1200">
+                    <a:solidFill>
+                      <a:schemeClr val="tx1"/>
+                    </a:solidFill>
+                    <a:latin typeface="+mn-lt"/>
+                    <a:ea typeface="+mn-ea"/>
+                    <a:cs typeface="+mn-cs"/>
+                  </a:defRPr>
+                </a:lvl4pPr>
+                <a:lvl5pPr marL="2057400" indent="-228600" algn="l" defTabSz="914400" rtl="0" eaLnBrk="1" latinLnBrk="0" hangingPunct="1">
+                  <a:lnSpc>
+                    <a:spcPct val="90000"/>
+                  </a:lnSpc>
+                  <a:spcBef>
+                    <a:spcPts val="500"/>
+                  </a:spcBef>
+                  <a:buFont typeface="Wingdings" panose="05000000000000000000" pitchFamily="2" charset="2"/>
+                  <a:buChar char="§"/>
+                  <a:defRPr sz="1600" kern="1200">
+                    <a:solidFill>
+                      <a:schemeClr val="tx1"/>
+                    </a:solidFill>
+                    <a:latin typeface="+mn-lt"/>
+                    <a:ea typeface="+mn-ea"/>
+                    <a:cs typeface="+mn-cs"/>
+                  </a:defRPr>
+                </a:lvl5pPr>
+                <a:lvl6pPr marL="2514600" indent="-228600" algn="l" defTabSz="914400" rtl="0" eaLnBrk="1" latinLnBrk="0" hangingPunct="1">
+                  <a:lnSpc>
+                    <a:spcPct val="90000"/>
+                  </a:lnSpc>
+                  <a:spcBef>
+                    <a:spcPts val="500"/>
+                  </a:spcBef>
+                  <a:buFont typeface="Arial" panose="020B0604020202020204" pitchFamily="34" charset="0"/>
+                  <a:buChar char="•"/>
+                  <a:defRPr sz="1800" kern="1200">
+                    <a:solidFill>
+                      <a:schemeClr val="tx1"/>
+                    </a:solidFill>
+                    <a:latin typeface="+mn-lt"/>
+                    <a:ea typeface="+mn-ea"/>
+                    <a:cs typeface="+mn-cs"/>
+                  </a:defRPr>
+                </a:lvl6pPr>
+                <a:lvl7pPr marL="2971800" indent="-228600" algn="l" defTabSz="914400" rtl="0" eaLnBrk="1" latinLnBrk="0" hangingPunct="1">
+                  <a:lnSpc>
+                    <a:spcPct val="90000"/>
+                  </a:lnSpc>
+                  <a:spcBef>
+                    <a:spcPts val="500"/>
+                  </a:spcBef>
+                  <a:buFont typeface="Arial" panose="020B0604020202020204" pitchFamily="34" charset="0"/>
+                  <a:buChar char="•"/>
+                  <a:defRPr sz="1800" kern="1200">
+                    <a:solidFill>
+                      <a:schemeClr val="tx1"/>
+                    </a:solidFill>
+                    <a:latin typeface="+mn-lt"/>
+                    <a:ea typeface="+mn-ea"/>
+                    <a:cs typeface="+mn-cs"/>
+                  </a:defRPr>
+                </a:lvl7pPr>
+                <a:lvl8pPr marL="3429000" indent="-228600" algn="l" defTabSz="914400" rtl="0" eaLnBrk="1" latinLnBrk="0" hangingPunct="1">
+                  <a:lnSpc>
+                    <a:spcPct val="90000"/>
+                  </a:lnSpc>
+                  <a:spcBef>
+                    <a:spcPts val="500"/>
+                  </a:spcBef>
+                  <a:buFont typeface="Arial" panose="020B0604020202020204" pitchFamily="34" charset="0"/>
+                  <a:buChar char="•"/>
+                  <a:defRPr sz="1800" kern="1200">
+                    <a:solidFill>
+                      <a:schemeClr val="tx1"/>
+                    </a:solidFill>
+                    <a:latin typeface="+mn-lt"/>
+                    <a:ea typeface="+mn-ea"/>
+                    <a:cs typeface="+mn-cs"/>
+                  </a:defRPr>
+                </a:lvl8pPr>
+                <a:lvl9pPr marL="3886200" indent="-228600" algn="l" defTabSz="914400" rtl="0" eaLnBrk="1" latinLnBrk="0" hangingPunct="1">
+                  <a:lnSpc>
+                    <a:spcPct val="90000"/>
+                  </a:lnSpc>
+                  <a:spcBef>
+                    <a:spcPts val="500"/>
+                  </a:spcBef>
+                  <a:buFont typeface="Arial" panose="020B0604020202020204" pitchFamily="34" charset="0"/>
+                  <a:buChar char="•"/>
+                  <a:defRPr sz="1800" kern="1200">
+                    <a:solidFill>
+                      <a:schemeClr val="tx1"/>
+                    </a:solidFill>
+                    <a:latin typeface="+mn-lt"/>
+                    <a:ea typeface="+mn-ea"/>
+                    <a:cs typeface="+mn-cs"/>
+                  </a:defRPr>
+                </a:lvl9pPr>
+              </a:lstStyle>
+              <a:p>
+                <a:pPr>
+                  <a:lnSpc>
+                    <a:spcPct val="100000"/>
+                  </a:lnSpc>
+                </a:pPr>
+                <a:r>
+                  <a:rPr lang="en-US" dirty="0"/>
+                  <a:t>For multi-channel </a:t>
+                </a:r>
+                <a14:m>
+                  <m:oMath xmlns:m="http://schemas.openxmlformats.org/officeDocument/2006/math">
+                    <m:r>
+                      <a:rPr lang="en-US" i="1">
+                        <a:latin typeface="Cambria Math" panose="02040503050406030204" pitchFamily="18" charset="0"/>
+                      </a:rPr>
+                      <m:t>𝑥</m:t>
+                    </m:r>
+                  </m:oMath>
+                </a14:m>
+                <a:r>
+                  <a:rPr lang="en-US" dirty="0"/>
+                  <a:t>, we use:</a:t>
+                </a:r>
+              </a:p>
+              <a:p>
+                <a:pPr marL="0" indent="0">
+                  <a:lnSpc>
+                    <a:spcPct val="100000"/>
+                  </a:lnSpc>
+                  <a:buFont typeface="Wingdings" panose="05000000000000000000" pitchFamily="2" charset="2"/>
+                  <a:buNone/>
+                </a:pPr>
+                <a14:m>
+                  <m:oMathPara xmlns:m="http://schemas.openxmlformats.org/officeDocument/2006/math">
+                    <m:oMathParaPr>
+                      <m:jc m:val="centerGroup"/>
+                    </m:oMathParaPr>
+                    <m:oMath xmlns:m="http://schemas.openxmlformats.org/officeDocument/2006/math">
+                      <m:r>
+                        <a:rPr lang="en-US" b="0" i="1" smtClean="0">
+                          <a:latin typeface="Cambria Math" panose="02040503050406030204" pitchFamily="18" charset="0"/>
+                        </a:rPr>
+                        <m:t>𝑋</m:t>
+                      </m:r>
+                      <m:r>
+                        <a:rPr lang="en-US" b="0" i="1" smtClean="0">
+                          <a:latin typeface="Cambria Math" panose="02040503050406030204" pitchFamily="18" charset="0"/>
+                        </a:rPr>
+                        <m:t>∗</m:t>
+                      </m:r>
+                      <m:r>
+                        <a:rPr lang="en-US" b="0" i="1" smtClean="0">
+                          <a:latin typeface="Cambria Math" panose="02040503050406030204" pitchFamily="18" charset="0"/>
+                        </a:rPr>
+                        <m:t>𝐾</m:t>
+                      </m:r>
+                      <m:d>
+                        <m:dPr>
+                          <m:ctrlPr>
+                            <a:rPr lang="en-US" i="1">
+                              <a:latin typeface="Cambria Math" panose="02040503050406030204" pitchFamily="18" charset="0"/>
+                            </a:rPr>
+                          </m:ctrlPr>
+                        </m:dPr>
+                        <m:e>
+                          <m:r>
+                            <a:rPr lang="en-US" i="1">
+                              <a:latin typeface="Cambria Math" panose="02040503050406030204" pitchFamily="18" charset="0"/>
+                            </a:rPr>
+                            <m:t>𝑖</m:t>
+                          </m:r>
+                          <m:r>
+                            <a:rPr lang="en-US" i="1">
+                              <a:latin typeface="Cambria Math" panose="02040503050406030204" pitchFamily="18" charset="0"/>
+                            </a:rPr>
+                            <m:t>,</m:t>
+                          </m:r>
+                          <m:r>
+                            <a:rPr lang="en-US" i="1">
+                              <a:latin typeface="Cambria Math" panose="02040503050406030204" pitchFamily="18" charset="0"/>
+                            </a:rPr>
+                            <m:t>𝑗</m:t>
+                          </m:r>
+                        </m:e>
+                      </m:d>
+                      <m:r>
+                        <a:rPr lang="en-US" i="1">
+                          <a:latin typeface="Cambria Math" panose="02040503050406030204" pitchFamily="18" charset="0"/>
+                        </a:rPr>
+                        <m:t>=</m:t>
+                      </m:r>
+                      <m:nary>
+                        <m:naryPr>
+                          <m:chr m:val="∑"/>
+                          <m:supHide m:val="on"/>
+                          <m:ctrlPr>
+                            <a:rPr lang="en-US" i="1">
+                              <a:latin typeface="Cambria Math" panose="02040503050406030204" pitchFamily="18" charset="0"/>
+                            </a:rPr>
+                          </m:ctrlPr>
+                        </m:naryPr>
+                        <m:sub>
+                          <m:r>
+                            <a:rPr lang="en-US" i="1">
+                              <a:latin typeface="Cambria Math" panose="02040503050406030204" pitchFamily="18" charset="0"/>
+                            </a:rPr>
+                            <m:t>𝑝</m:t>
+                          </m:r>
+                          <m:r>
+                            <a:rPr lang="en-US" i="1">
+                              <a:latin typeface="Cambria Math" panose="02040503050406030204" pitchFamily="18" charset="0"/>
+                            </a:rPr>
+                            <m:t>,</m:t>
+                          </m:r>
+                          <m:r>
+                            <a:rPr lang="en-US" i="1">
+                              <a:latin typeface="Cambria Math" panose="02040503050406030204" pitchFamily="18" charset="0"/>
+                            </a:rPr>
+                            <m:t>𝑞</m:t>
+                          </m:r>
+                          <m:r>
+                            <a:rPr lang="en-US" i="1">
+                              <a:latin typeface="Cambria Math" panose="02040503050406030204" pitchFamily="18" charset="0"/>
+                            </a:rPr>
+                            <m:t>,</m:t>
+                          </m:r>
+                          <m:r>
+                            <a:rPr lang="en-US" i="1">
+                              <a:latin typeface="Cambria Math" panose="02040503050406030204" pitchFamily="18" charset="0"/>
+                            </a:rPr>
+                            <m:t>𝑐</m:t>
+                          </m:r>
+                        </m:sub>
+                        <m:sup/>
+                        <m:e>
+                          <m:r>
+                            <a:rPr lang="en-US" i="1">
+                              <a:latin typeface="Cambria Math" panose="02040503050406030204" pitchFamily="18" charset="0"/>
+                            </a:rPr>
+                            <m:t>𝑋</m:t>
+                          </m:r>
+                          <m:d>
+                            <m:dPr>
+                              <m:ctrlPr>
+                                <a:rPr lang="en-US" i="1">
+                                  <a:latin typeface="Cambria Math" panose="02040503050406030204" pitchFamily="18" charset="0"/>
+                                </a:rPr>
+                              </m:ctrlPr>
+                            </m:dPr>
+                            <m:e>
+                              <m:r>
+                                <a:rPr lang="en-US" i="1">
+                                  <a:latin typeface="Cambria Math" panose="02040503050406030204" pitchFamily="18" charset="0"/>
+                                </a:rPr>
+                                <m:t>𝑝</m:t>
+                              </m:r>
+                              <m:r>
+                                <a:rPr lang="en-US" i="1">
+                                  <a:latin typeface="Cambria Math" panose="02040503050406030204" pitchFamily="18" charset="0"/>
+                                </a:rPr>
+                                <m:t>,</m:t>
+                              </m:r>
+                              <m:r>
+                                <a:rPr lang="en-US" i="1">
+                                  <a:latin typeface="Cambria Math" panose="02040503050406030204" pitchFamily="18" charset="0"/>
+                                </a:rPr>
+                                <m:t>𝑞</m:t>
+                              </m:r>
+                              <m:r>
+                                <a:rPr lang="en-US" i="1">
+                                  <a:latin typeface="Cambria Math" panose="02040503050406030204" pitchFamily="18" charset="0"/>
+                                </a:rPr>
+                                <m:t>,</m:t>
+                              </m:r>
+                              <m:r>
+                                <a:rPr lang="en-US" i="1">
+                                  <a:latin typeface="Cambria Math" panose="02040503050406030204" pitchFamily="18" charset="0"/>
+                                </a:rPr>
+                                <m:t>𝑐</m:t>
+                              </m:r>
+                            </m:e>
+                          </m:d>
+                          <m:r>
+                            <a:rPr lang="en-US" i="1">
+                              <a:latin typeface="Cambria Math" panose="02040503050406030204" pitchFamily="18" charset="0"/>
+                            </a:rPr>
+                            <m:t>⋅</m:t>
+                          </m:r>
+                          <m:r>
+                            <a:rPr lang="en-US" i="1">
+                              <a:latin typeface="Cambria Math" panose="02040503050406030204" pitchFamily="18" charset="0"/>
+                            </a:rPr>
+                            <m:t>𝐾</m:t>
+                          </m:r>
+                          <m:r>
+                            <a:rPr lang="en-US" i="1">
+                              <a:latin typeface="Cambria Math" panose="02040503050406030204" pitchFamily="18" charset="0"/>
+                            </a:rPr>
+                            <m:t>(</m:t>
+                          </m:r>
+                          <m:r>
+                            <a:rPr lang="en-US" i="1">
+                              <a:latin typeface="Cambria Math" panose="02040503050406030204" pitchFamily="18" charset="0"/>
+                            </a:rPr>
+                            <m:t>𝑖</m:t>
+                          </m:r>
+                          <m:r>
+                            <a:rPr lang="en-US" i="1">
+                              <a:latin typeface="Cambria Math" panose="02040503050406030204" pitchFamily="18" charset="0"/>
+                            </a:rPr>
+                            <m:t>−</m:t>
+                          </m:r>
+                          <m:r>
+                            <a:rPr lang="en-US" i="1">
+                              <a:latin typeface="Cambria Math" panose="02040503050406030204" pitchFamily="18" charset="0"/>
+                            </a:rPr>
+                            <m:t>𝑝</m:t>
+                          </m:r>
+                          <m:r>
+                            <a:rPr lang="en-US" i="1">
+                              <a:latin typeface="Cambria Math" panose="02040503050406030204" pitchFamily="18" charset="0"/>
+                            </a:rPr>
+                            <m:t>,</m:t>
+                          </m:r>
+                          <m:r>
+                            <a:rPr lang="en-US" i="1">
+                              <a:latin typeface="Cambria Math" panose="02040503050406030204" pitchFamily="18" charset="0"/>
+                            </a:rPr>
+                            <m:t>𝑗</m:t>
+                          </m:r>
+                          <m:r>
+                            <a:rPr lang="en-US" i="1">
+                              <a:latin typeface="Cambria Math" panose="02040503050406030204" pitchFamily="18" charset="0"/>
+                            </a:rPr>
+                            <m:t>−</m:t>
+                          </m:r>
+                          <m:r>
+                            <a:rPr lang="en-US" i="1">
+                              <a:latin typeface="Cambria Math" panose="02040503050406030204" pitchFamily="18" charset="0"/>
+                            </a:rPr>
+                            <m:t>𝑞</m:t>
+                          </m:r>
+                          <m:r>
+                            <a:rPr lang="en-US" i="1">
+                              <a:latin typeface="Cambria Math" panose="02040503050406030204" pitchFamily="18" charset="0"/>
+                            </a:rPr>
+                            <m:t>,</m:t>
+                          </m:r>
+                          <m:r>
+                            <a:rPr lang="en-US" i="1">
+                              <a:latin typeface="Cambria Math" panose="02040503050406030204" pitchFamily="18" charset="0"/>
+                            </a:rPr>
+                            <m:t>𝑐</m:t>
+                          </m:r>
+                          <m:r>
+                            <a:rPr lang="en-US" i="1">
+                              <a:latin typeface="Cambria Math" panose="02040503050406030204" pitchFamily="18" charset="0"/>
+                            </a:rPr>
+                            <m:t>)</m:t>
+                          </m:r>
+                        </m:e>
+                      </m:nary>
+                    </m:oMath>
+                  </m:oMathPara>
+                </a14:m>
+                <a:endParaRPr lang="en-US" dirty="0"/>
+              </a:p>
+            </p:txBody>
+          </p:sp>
+        </mc:Choice>
+        <mc:Fallback xmlns="">
+          <p:sp>
+            <p:nvSpPr>
+              <p:cNvPr id="5" name="Content Placeholder 4">
+                <a:extLst>
+                  <a:ext uri="{FF2B5EF4-FFF2-40B4-BE49-F238E27FC236}">
+                    <a16:creationId xmlns:a16="http://schemas.microsoft.com/office/drawing/2014/main" id="{8D31EDED-9C58-E4E1-E582-0A6E0F5E7DB6}"/>
+                  </a:ext>
+                </a:extLst>
+              </p:cNvPr>
+              <p:cNvSpPr txBox="1">
+                <a:spLocks noRot="1" noChangeAspect="1" noMove="1" noResize="1" noEditPoints="1" noAdjustHandles="1" noChangeArrowheads="1" noChangeShapeType="1" noTextEdit="1"/>
+              </p:cNvSpPr>
+              <p:nvPr/>
+            </p:nvSpPr>
+            <p:spPr>
+              <a:xfrm>
+                <a:off x="5362451" y="4583605"/>
+                <a:ext cx="6496297" cy="1437519"/>
+              </a:xfrm>
+              <a:prstGeom prst="rect">
+                <a:avLst/>
+              </a:prstGeom>
+              <a:blipFill>
+                <a:blip r:embed="rId5"/>
+                <a:stretch>
+                  <a:fillRect l="-1315" t="-3390"/>
+                </a:stretch>
+              </a:blipFill>
+            </p:spPr>
+            <p:txBody>
+              <a:bodyPr/>
+              <a:lstStyle/>
+              <a:p>
+                <a:r>
+                  <a:rPr lang="en-US">
+                    <a:noFill/>
+                  </a:rPr>
+                  <a:t> </a:t>
+                </a:r>
+              </a:p>
+            </p:txBody>
+          </p:sp>
+        </mc:Fallback>
+      </mc:AlternateContent>
     </p:spTree>
     <p:extLst>
       <p:ext uri="{BB962C8B-B14F-4D97-AF65-F5344CB8AC3E}">
@@ -34496,14 +34401,14 @@
           </a:ln>
           <a:extLst>
             <a:ext uri="{909E8E84-426E-40dd-AFC4-6F175D3DCCD1}">
-              <a14:hiddenFill xmlns:a14="http://schemas.microsoft.com/office/drawing/2010/main" xmlns="">
+              <a14:hiddenFill xmlns="" xmlns:a14="http://schemas.microsoft.com/office/drawing/2010/main">
                 <a:solidFill>
                   <a:srgbClr val="FFFFFF"/>
                 </a:solidFill>
               </a14:hiddenFill>
             </a:ext>
             <a:ext uri="{91240B29-F687-4f45-9708-019B960494DF}">
-              <a14:hiddenLine xmlns:a14="http://schemas.microsoft.com/office/drawing/2010/main" xmlns="" w="9525">
+              <a14:hiddenLine xmlns="" xmlns:a14="http://schemas.microsoft.com/office/drawing/2010/main" w="9525">
                 <a:solidFill>
                   <a:srgbClr val="000000"/>
                 </a:solidFill>
@@ -34513,7 +34418,7 @@
               </a14:hiddenLine>
             </a:ext>
             <a:ext uri="{FAA26D3D-D897-4be2-8F04-BA451C77F1D7}">
-              <ma14:placeholderFlag xmlns:ma14="http://schemas.microsoft.com/office/mac/drawingml/2011/main" xmlns="" val="1"/>
+              <ma14:placeholderFlag xmlns="" xmlns:ma14="http://schemas.microsoft.com/office/mac/drawingml/2011/main" val="1"/>
             </a:ext>
           </a:extLst>
         </p:spPr>
@@ -35911,12 +35816,23 @@
 </file>
 
 <file path=customXml/item1.xml><?xml version="1.0" encoding="utf-8"?>
-<?mso-contentType ?>
-<FormTemplates xmlns="http://schemas.microsoft.com/sharepoint/v3/contenttype/forms">
-  <Display>DocumentLibraryForm</Display>
-  <Edit>DocumentLibraryForm</Edit>
-  <New>DocumentLibraryForm</New>
-</FormTemplates>
+<p:properties xmlns:p="http://schemas.microsoft.com/office/2006/metadata/properties" xmlns:xsi="http://www.w3.org/2001/XMLSchema-instance" xmlns:pc="http://schemas.microsoft.com/office/infopath/2007/PartnerControls">
+  <documentManagement>
+    <_ip_UnifiedCompliancePolicyUIAction xmlns="http://schemas.microsoft.com/sharepoint/v3" xsi:nil="true"/>
+    <Image xmlns="71af3243-3dd4-4a8d-8c0d-dd76da1f02a5">
+      <Url xsi:nil="true"/>
+      <Description xsi:nil="true"/>
+    </Image>
+    <Status xmlns="71af3243-3dd4-4a8d-8c0d-dd76da1f02a5">Not started</Status>
+    <Background xmlns="71af3243-3dd4-4a8d-8c0d-dd76da1f02a5">false</Background>
+    <_ip_UnifiedCompliancePolicyProperties xmlns="http://schemas.microsoft.com/sharepoint/v3" xsi:nil="true"/>
+    <ImageTagsTaxHTField xmlns="71af3243-3dd4-4a8d-8c0d-dd76da1f02a5">
+      <Terms xmlns="http://schemas.microsoft.com/office/infopath/2007/PartnerControls"/>
+    </ImageTagsTaxHTField>
+    <TaxCatchAll xmlns="230e9df3-be65-4c73-a93b-d1236ebd677e" xsi:nil="true"/>
+    <MediaServiceKeyPoints xmlns="71af3243-3dd4-4a8d-8c0d-dd76da1f02a5" xsi:nil="true"/>
+  </documentManagement>
+</p:properties>
 </file>
 
 <file path=customXml/item2.xml><?xml version="1.0" encoding="utf-8"?>
@@ -36208,29 +36124,22 @@
 </file>
 
 <file path=customXml/item3.xml><?xml version="1.0" encoding="utf-8"?>
-<p:properties xmlns:p="http://schemas.microsoft.com/office/2006/metadata/properties" xmlns:xsi="http://www.w3.org/2001/XMLSchema-instance" xmlns:pc="http://schemas.microsoft.com/office/infopath/2007/PartnerControls">
-  <documentManagement>
-    <_ip_UnifiedCompliancePolicyUIAction xmlns="http://schemas.microsoft.com/sharepoint/v3" xsi:nil="true"/>
-    <Image xmlns="71af3243-3dd4-4a8d-8c0d-dd76da1f02a5">
-      <Url xsi:nil="true"/>
-      <Description xsi:nil="true"/>
-    </Image>
-    <Status xmlns="71af3243-3dd4-4a8d-8c0d-dd76da1f02a5">Not started</Status>
-    <Background xmlns="71af3243-3dd4-4a8d-8c0d-dd76da1f02a5">false</Background>
-    <_ip_UnifiedCompliancePolicyProperties xmlns="http://schemas.microsoft.com/sharepoint/v3" xsi:nil="true"/>
-    <ImageTagsTaxHTField xmlns="71af3243-3dd4-4a8d-8c0d-dd76da1f02a5">
-      <Terms xmlns="http://schemas.microsoft.com/office/infopath/2007/PartnerControls"/>
-    </ImageTagsTaxHTField>
-    <TaxCatchAll xmlns="230e9df3-be65-4c73-a93b-d1236ebd677e" xsi:nil="true"/>
-    <MediaServiceKeyPoints xmlns="71af3243-3dd4-4a8d-8c0d-dd76da1f02a5" xsi:nil="true"/>
-  </documentManagement>
-</p:properties>
+<?mso-contentType ?>
+<FormTemplates xmlns="http://schemas.microsoft.com/sharepoint/v3/contenttype/forms">
+  <Display>DocumentLibraryForm</Display>
+  <Edit>DocumentLibraryForm</Edit>
+  <New>DocumentLibraryForm</New>
+</FormTemplates>
 </file>
 
 <file path=customXml/itemProps1.xml><?xml version="1.0" encoding="utf-8"?>
-<ds:datastoreItem xmlns:ds="http://schemas.openxmlformats.org/officeDocument/2006/customXml" ds:itemID="{6F156100-9533-4411-B0C0-FA18F914F7B6}">
+<ds:datastoreItem xmlns:ds="http://schemas.openxmlformats.org/officeDocument/2006/customXml" ds:itemID="{B2C81503-9DEF-42F3-A99B-D5E0223E195B}">
   <ds:schemaRefs>
-    <ds:schemaRef ds:uri="http://schemas.microsoft.com/sharepoint/v3/contenttype/forms"/>
+    <ds:schemaRef ds:uri="http://schemas.microsoft.com/office/2006/metadata/properties"/>
+    <ds:schemaRef ds:uri="http://schemas.microsoft.com/office/infopath/2007/PartnerControls"/>
+    <ds:schemaRef ds:uri="http://schemas.microsoft.com/sharepoint/v3"/>
+    <ds:schemaRef ds:uri="71af3243-3dd4-4a8d-8c0d-dd76da1f02a5"/>
+    <ds:schemaRef ds:uri="230e9df3-be65-4c73-a93b-d1236ebd677e"/>
   </ds:schemaRefs>
 </ds:datastoreItem>
 </file>
@@ -36257,13 +36166,9 @@
 </file>
 
 <file path=customXml/itemProps3.xml><?xml version="1.0" encoding="utf-8"?>
-<ds:datastoreItem xmlns:ds="http://schemas.openxmlformats.org/officeDocument/2006/customXml" ds:itemID="{B2C81503-9DEF-42F3-A99B-D5E0223E195B}">
+<ds:datastoreItem xmlns:ds="http://schemas.openxmlformats.org/officeDocument/2006/customXml" ds:itemID="{6F156100-9533-4411-B0C0-FA18F914F7B6}">
   <ds:schemaRefs>
-    <ds:schemaRef ds:uri="http://schemas.microsoft.com/office/2006/metadata/properties"/>
-    <ds:schemaRef ds:uri="http://schemas.microsoft.com/office/infopath/2007/PartnerControls"/>
-    <ds:schemaRef ds:uri="http://schemas.microsoft.com/sharepoint/v3"/>
-    <ds:schemaRef ds:uri="71af3243-3dd4-4a8d-8c0d-dd76da1f02a5"/>
-    <ds:schemaRef ds:uri="230e9df3-be65-4c73-a93b-d1236ebd677e"/>
+    <ds:schemaRef ds:uri="http://schemas.microsoft.com/sharepoint/v3/contenttype/forms"/>
   </ds:schemaRefs>
 </ds:datastoreItem>
 </file>

</xml_diff>